<commit_message>
WIP error restriction kernel
</commit_message>
<xml_diff>
--- a/data/process.pptx
+++ b/data/process.pptx
@@ -260,7 +260,7 @@
           <a:p>
             <a:fld id="{E992569B-202C-4FD8-B783-901FE4087DE5}" type="datetimeFigureOut">
               <a:rPr lang="en-US" smtClean="0"/>
-              <a:t>8/20/2018</a:t>
+              <a:t>8/21/2018</a:t>
             </a:fld>
             <a:endParaRPr lang="en-US"/>
           </a:p>
@@ -458,7 +458,7 @@
           <a:p>
             <a:fld id="{E992569B-202C-4FD8-B783-901FE4087DE5}" type="datetimeFigureOut">
               <a:rPr lang="en-US" smtClean="0"/>
-              <a:t>8/20/2018</a:t>
+              <a:t>8/21/2018</a:t>
             </a:fld>
             <a:endParaRPr lang="en-US"/>
           </a:p>
@@ -666,7 +666,7 @@
           <a:p>
             <a:fld id="{E992569B-202C-4FD8-B783-901FE4087DE5}" type="datetimeFigureOut">
               <a:rPr lang="en-US" smtClean="0"/>
-              <a:t>8/20/2018</a:t>
+              <a:t>8/21/2018</a:t>
             </a:fld>
             <a:endParaRPr lang="en-US"/>
           </a:p>
@@ -864,7 +864,7 @@
           <a:p>
             <a:fld id="{E992569B-202C-4FD8-B783-901FE4087DE5}" type="datetimeFigureOut">
               <a:rPr lang="en-US" smtClean="0"/>
-              <a:t>8/20/2018</a:t>
+              <a:t>8/21/2018</a:t>
             </a:fld>
             <a:endParaRPr lang="en-US"/>
           </a:p>
@@ -1139,7 +1139,7 @@
           <a:p>
             <a:fld id="{E992569B-202C-4FD8-B783-901FE4087DE5}" type="datetimeFigureOut">
               <a:rPr lang="en-US" smtClean="0"/>
-              <a:t>8/20/2018</a:t>
+              <a:t>8/21/2018</a:t>
             </a:fld>
             <a:endParaRPr lang="en-US"/>
           </a:p>
@@ -1404,7 +1404,7 @@
           <a:p>
             <a:fld id="{E992569B-202C-4FD8-B783-901FE4087DE5}" type="datetimeFigureOut">
               <a:rPr lang="en-US" smtClean="0"/>
-              <a:t>8/20/2018</a:t>
+              <a:t>8/21/2018</a:t>
             </a:fld>
             <a:endParaRPr lang="en-US"/>
           </a:p>
@@ -1816,7 +1816,7 @@
           <a:p>
             <a:fld id="{E992569B-202C-4FD8-B783-901FE4087DE5}" type="datetimeFigureOut">
               <a:rPr lang="en-US" smtClean="0"/>
-              <a:t>8/20/2018</a:t>
+              <a:t>8/21/2018</a:t>
             </a:fld>
             <a:endParaRPr lang="en-US"/>
           </a:p>
@@ -1957,7 +1957,7 @@
           <a:p>
             <a:fld id="{E992569B-202C-4FD8-B783-901FE4087DE5}" type="datetimeFigureOut">
               <a:rPr lang="en-US" smtClean="0"/>
-              <a:t>8/20/2018</a:t>
+              <a:t>8/21/2018</a:t>
             </a:fld>
             <a:endParaRPr lang="en-US"/>
           </a:p>
@@ -2070,7 +2070,7 @@
           <a:p>
             <a:fld id="{E992569B-202C-4FD8-B783-901FE4087DE5}" type="datetimeFigureOut">
               <a:rPr lang="en-US" smtClean="0"/>
-              <a:t>8/20/2018</a:t>
+              <a:t>8/21/2018</a:t>
             </a:fld>
             <a:endParaRPr lang="en-US"/>
           </a:p>
@@ -2381,7 +2381,7 @@
           <a:p>
             <a:fld id="{E992569B-202C-4FD8-B783-901FE4087DE5}" type="datetimeFigureOut">
               <a:rPr lang="en-US" smtClean="0"/>
-              <a:t>8/20/2018</a:t>
+              <a:t>8/21/2018</a:t>
             </a:fld>
             <a:endParaRPr lang="en-US"/>
           </a:p>
@@ -2669,7 +2669,7 @@
           <a:p>
             <a:fld id="{E992569B-202C-4FD8-B783-901FE4087DE5}" type="datetimeFigureOut">
               <a:rPr lang="en-US" smtClean="0"/>
-              <a:t>8/20/2018</a:t>
+              <a:t>8/21/2018</a:t>
             </a:fld>
             <a:endParaRPr lang="en-US"/>
           </a:p>
@@ -2910,7 +2910,7 @@
           <a:p>
             <a:fld id="{E992569B-202C-4FD8-B783-901FE4087DE5}" type="datetimeFigureOut">
               <a:rPr lang="en-US" smtClean="0"/>
-              <a:t>8/20/2018</a:t>
+              <a:t>8/21/2018</a:t>
             </a:fld>
             <a:endParaRPr lang="en-US"/>
           </a:p>
@@ -15496,6 +15496,214 @@
           </a:p>
         </p:txBody>
       </p:sp>
+      <p:sp>
+        <p:nvSpPr>
+          <p:cNvPr id="3" name="Rectangle: Rounded Corners 2">
+            <a:extLst>
+              <a:ext uri="{FF2B5EF4-FFF2-40B4-BE49-F238E27FC236}">
+                <a16:creationId xmlns:a16="http://schemas.microsoft.com/office/drawing/2014/main" id="{CA1692C2-F46E-455A-9A84-C30A7C4D4363}"/>
+              </a:ext>
+            </a:extLst>
+          </p:cNvPr>
+          <p:cNvSpPr/>
+          <p:nvPr/>
+        </p:nvSpPr>
+        <p:spPr>
+          <a:xfrm>
+            <a:off x="157804" y="452591"/>
+            <a:ext cx="2998308" cy="2517066"/>
+          </a:xfrm>
+          <a:prstGeom prst="roundRect">
+            <a:avLst/>
+          </a:prstGeom>
+          <a:solidFill>
+            <a:srgbClr val="70AD47">
+              <a:alpha val="25098"/>
+            </a:srgbClr>
+          </a:solidFill>
+          <a:ln>
+            <a:noFill/>
+          </a:ln>
+        </p:spPr>
+        <p:style>
+          <a:lnRef idx="0">
+            <a:scrgbClr r="0" g="0" b="0"/>
+          </a:lnRef>
+          <a:fillRef idx="0">
+            <a:scrgbClr r="0" g="0" b="0"/>
+          </a:fillRef>
+          <a:effectRef idx="0">
+            <a:scrgbClr r="0" g="0" b="0"/>
+          </a:effectRef>
+          <a:fontRef idx="minor">
+            <a:schemeClr val="lt1"/>
+          </a:fontRef>
+        </p:style>
+        <p:txBody>
+          <a:bodyPr rtlCol="0" anchor="ctr"/>
+          <a:lstStyle/>
+          <a:p>
+            <a:pPr algn="ctr"/>
+            <a:endParaRPr lang="en-US"/>
+          </a:p>
+        </p:txBody>
+      </p:sp>
+      <p:sp>
+        <p:nvSpPr>
+          <p:cNvPr id="128" name="Rectangle: Rounded Corners 127">
+            <a:extLst>
+              <a:ext uri="{FF2B5EF4-FFF2-40B4-BE49-F238E27FC236}">
+                <a16:creationId xmlns:a16="http://schemas.microsoft.com/office/drawing/2014/main" id="{7CC8F3EA-8022-4725-9E43-5F531088D54F}"/>
+              </a:ext>
+            </a:extLst>
+          </p:cNvPr>
+          <p:cNvSpPr/>
+          <p:nvPr/>
+        </p:nvSpPr>
+        <p:spPr>
+          <a:xfrm>
+            <a:off x="3203392" y="916660"/>
+            <a:ext cx="2998308" cy="1171313"/>
+          </a:xfrm>
+          <a:prstGeom prst="roundRect">
+            <a:avLst/>
+          </a:prstGeom>
+          <a:solidFill>
+            <a:srgbClr val="70AD47">
+              <a:alpha val="25098"/>
+            </a:srgbClr>
+          </a:solidFill>
+          <a:ln>
+            <a:noFill/>
+          </a:ln>
+        </p:spPr>
+        <p:style>
+          <a:lnRef idx="0">
+            <a:scrgbClr r="0" g="0" b="0"/>
+          </a:lnRef>
+          <a:fillRef idx="0">
+            <a:scrgbClr r="0" g="0" b="0"/>
+          </a:fillRef>
+          <a:effectRef idx="0">
+            <a:scrgbClr r="0" g="0" b="0"/>
+          </a:effectRef>
+          <a:fontRef idx="minor">
+            <a:schemeClr val="lt1"/>
+          </a:fontRef>
+        </p:style>
+        <p:txBody>
+          <a:bodyPr rtlCol="0" anchor="ctr"/>
+          <a:lstStyle/>
+          <a:p>
+            <a:pPr algn="ctr"/>
+            <a:endParaRPr lang="en-US"/>
+          </a:p>
+        </p:txBody>
+      </p:sp>
+      <p:sp>
+        <p:nvSpPr>
+          <p:cNvPr id="134" name="Rectangle: Rounded Corners 133">
+            <a:extLst>
+              <a:ext uri="{FF2B5EF4-FFF2-40B4-BE49-F238E27FC236}">
+                <a16:creationId xmlns:a16="http://schemas.microsoft.com/office/drawing/2014/main" id="{6C3A1A52-FD45-47E3-BD35-D562E51A4A6C}"/>
+              </a:ext>
+            </a:extLst>
+          </p:cNvPr>
+          <p:cNvSpPr/>
+          <p:nvPr/>
+        </p:nvSpPr>
+        <p:spPr>
+          <a:xfrm>
+            <a:off x="3569698" y="4988113"/>
+            <a:ext cx="1132848" cy="1509086"/>
+          </a:xfrm>
+          <a:prstGeom prst="roundRect">
+            <a:avLst/>
+          </a:prstGeom>
+          <a:solidFill>
+            <a:srgbClr val="70AD47">
+              <a:alpha val="25098"/>
+            </a:srgbClr>
+          </a:solidFill>
+          <a:ln>
+            <a:noFill/>
+          </a:ln>
+        </p:spPr>
+        <p:style>
+          <a:lnRef idx="0">
+            <a:scrgbClr r="0" g="0" b="0"/>
+          </a:lnRef>
+          <a:fillRef idx="0">
+            <a:scrgbClr r="0" g="0" b="0"/>
+          </a:fillRef>
+          <a:effectRef idx="0">
+            <a:scrgbClr r="0" g="0" b="0"/>
+          </a:effectRef>
+          <a:fontRef idx="minor">
+            <a:schemeClr val="lt1"/>
+          </a:fontRef>
+        </p:style>
+        <p:txBody>
+          <a:bodyPr rtlCol="0" anchor="ctr"/>
+          <a:lstStyle/>
+          <a:p>
+            <a:pPr algn="ctr"/>
+            <a:endParaRPr lang="en-US"/>
+          </a:p>
+        </p:txBody>
+      </p:sp>
+      <p:sp>
+        <p:nvSpPr>
+          <p:cNvPr id="137" name="Rectangle: Rounded Corners 136">
+            <a:extLst>
+              <a:ext uri="{FF2B5EF4-FFF2-40B4-BE49-F238E27FC236}">
+                <a16:creationId xmlns:a16="http://schemas.microsoft.com/office/drawing/2014/main" id="{3AA86C7E-5E86-4F89-A105-DAA3F45AD300}"/>
+              </a:ext>
+            </a:extLst>
+          </p:cNvPr>
+          <p:cNvSpPr/>
+          <p:nvPr/>
+        </p:nvSpPr>
+        <p:spPr>
+          <a:xfrm>
+            <a:off x="1095997" y="3052292"/>
+            <a:ext cx="1132848" cy="1509086"/>
+          </a:xfrm>
+          <a:prstGeom prst="roundRect">
+            <a:avLst/>
+          </a:prstGeom>
+          <a:solidFill>
+            <a:srgbClr val="70AD47">
+              <a:alpha val="25098"/>
+            </a:srgbClr>
+          </a:solidFill>
+          <a:ln>
+            <a:noFill/>
+          </a:ln>
+        </p:spPr>
+        <p:style>
+          <a:lnRef idx="0">
+            <a:scrgbClr r="0" g="0" b="0"/>
+          </a:lnRef>
+          <a:fillRef idx="0">
+            <a:scrgbClr r="0" g="0" b="0"/>
+          </a:fillRef>
+          <a:effectRef idx="0">
+            <a:scrgbClr r="0" g="0" b="0"/>
+          </a:effectRef>
+          <a:fontRef idx="minor">
+            <a:schemeClr val="lt1"/>
+          </a:fontRef>
+        </p:style>
+        <p:txBody>
+          <a:bodyPr rtlCol="0" anchor="ctr"/>
+          <a:lstStyle/>
+          <a:p>
+            <a:pPr algn="ctr"/>
+            <a:endParaRPr lang="en-US"/>
+          </a:p>
+        </p:txBody>
+      </p:sp>
     </p:spTree>
     <p:extLst>
       <p:ext uri="{BB962C8B-B14F-4D97-AF65-F5344CB8AC3E}">

</xml_diff>

<commit_message>
WIP finished interpolation kernel
</commit_message>
<xml_diff>
--- a/data/process.pptx
+++ b/data/process.pptx
@@ -260,7 +260,7 @@
           <a:p>
             <a:fld id="{E992569B-202C-4FD8-B783-901FE4087DE5}" type="datetimeFigureOut">
               <a:rPr lang="en-US" smtClean="0"/>
-              <a:t>8/21/2018</a:t>
+              <a:t>8/22/2018</a:t>
             </a:fld>
             <a:endParaRPr lang="en-US"/>
           </a:p>
@@ -458,7 +458,7 @@
           <a:p>
             <a:fld id="{E992569B-202C-4FD8-B783-901FE4087DE5}" type="datetimeFigureOut">
               <a:rPr lang="en-US" smtClean="0"/>
-              <a:t>8/21/2018</a:t>
+              <a:t>8/22/2018</a:t>
             </a:fld>
             <a:endParaRPr lang="en-US"/>
           </a:p>
@@ -666,7 +666,7 @@
           <a:p>
             <a:fld id="{E992569B-202C-4FD8-B783-901FE4087DE5}" type="datetimeFigureOut">
               <a:rPr lang="en-US" smtClean="0"/>
-              <a:t>8/21/2018</a:t>
+              <a:t>8/22/2018</a:t>
             </a:fld>
             <a:endParaRPr lang="en-US"/>
           </a:p>
@@ -864,7 +864,7 @@
           <a:p>
             <a:fld id="{E992569B-202C-4FD8-B783-901FE4087DE5}" type="datetimeFigureOut">
               <a:rPr lang="en-US" smtClean="0"/>
-              <a:t>8/21/2018</a:t>
+              <a:t>8/22/2018</a:t>
             </a:fld>
             <a:endParaRPr lang="en-US"/>
           </a:p>
@@ -1139,7 +1139,7 @@
           <a:p>
             <a:fld id="{E992569B-202C-4FD8-B783-901FE4087DE5}" type="datetimeFigureOut">
               <a:rPr lang="en-US" smtClean="0"/>
-              <a:t>8/21/2018</a:t>
+              <a:t>8/22/2018</a:t>
             </a:fld>
             <a:endParaRPr lang="en-US"/>
           </a:p>
@@ -1404,7 +1404,7 @@
           <a:p>
             <a:fld id="{E992569B-202C-4FD8-B783-901FE4087DE5}" type="datetimeFigureOut">
               <a:rPr lang="en-US" smtClean="0"/>
-              <a:t>8/21/2018</a:t>
+              <a:t>8/22/2018</a:t>
             </a:fld>
             <a:endParaRPr lang="en-US"/>
           </a:p>
@@ -1816,7 +1816,7 @@
           <a:p>
             <a:fld id="{E992569B-202C-4FD8-B783-901FE4087DE5}" type="datetimeFigureOut">
               <a:rPr lang="en-US" smtClean="0"/>
-              <a:t>8/21/2018</a:t>
+              <a:t>8/22/2018</a:t>
             </a:fld>
             <a:endParaRPr lang="en-US"/>
           </a:p>
@@ -1957,7 +1957,7 @@
           <a:p>
             <a:fld id="{E992569B-202C-4FD8-B783-901FE4087DE5}" type="datetimeFigureOut">
               <a:rPr lang="en-US" smtClean="0"/>
-              <a:t>8/21/2018</a:t>
+              <a:t>8/22/2018</a:t>
             </a:fld>
             <a:endParaRPr lang="en-US"/>
           </a:p>
@@ -2070,7 +2070,7 @@
           <a:p>
             <a:fld id="{E992569B-202C-4FD8-B783-901FE4087DE5}" type="datetimeFigureOut">
               <a:rPr lang="en-US" smtClean="0"/>
-              <a:t>8/21/2018</a:t>
+              <a:t>8/22/2018</a:t>
             </a:fld>
             <a:endParaRPr lang="en-US"/>
           </a:p>
@@ -2381,7 +2381,7 @@
           <a:p>
             <a:fld id="{E992569B-202C-4FD8-B783-901FE4087DE5}" type="datetimeFigureOut">
               <a:rPr lang="en-US" smtClean="0"/>
-              <a:t>8/21/2018</a:t>
+              <a:t>8/22/2018</a:t>
             </a:fld>
             <a:endParaRPr lang="en-US"/>
           </a:p>
@@ -2669,7 +2669,7 @@
           <a:p>
             <a:fld id="{E992569B-202C-4FD8-B783-901FE4087DE5}" type="datetimeFigureOut">
               <a:rPr lang="en-US" smtClean="0"/>
-              <a:t>8/21/2018</a:t>
+              <a:t>8/22/2018</a:t>
             </a:fld>
             <a:endParaRPr lang="en-US"/>
           </a:p>
@@ -2910,7 +2910,7 @@
           <a:p>
             <a:fld id="{E992569B-202C-4FD8-B783-901FE4087DE5}" type="datetimeFigureOut">
               <a:rPr lang="en-US" smtClean="0"/>
-              <a:t>8/21/2018</a:t>
+              <a:t>8/22/2018</a:t>
             </a:fld>
             <a:endParaRPr lang="en-US"/>
           </a:p>
@@ -15448,7 +15448,7 @@
           <a:p>
             <a:r>
               <a:rPr lang="en-US" sz="1050" dirty="0"/>
-              <a:t>2</a:t>
+              <a:t>3</a:t>
             </a:r>
             <a:r>
               <a:rPr lang="en-US" sz="1050" baseline="30000" dirty="0"/>
@@ -15486,8 +15486,12 @@
           <a:lstStyle/>
           <a:p>
             <a:r>
+              <a:rPr lang="en-US" sz="1050"/>
+              <a:t>(3+5i</a:t>
+            </a:r>
+            <a:r>
               <a:rPr lang="en-US" sz="1050" dirty="0"/>
-              <a:t>(3+4i)</a:t>
+              <a:t>)</a:t>
             </a:r>
             <a:r>
               <a:rPr lang="en-US" sz="1050" baseline="30000" dirty="0"/>

</xml_diff>

<commit_message>
WIP lin sys generation on all levels, I generation on the fly
</commit_message>
<xml_diff>
--- a/data/process.pptx
+++ b/data/process.pptx
@@ -260,7 +260,7 @@
           <a:p>
             <a:fld id="{E992569B-202C-4FD8-B783-901FE4087DE5}" type="datetimeFigureOut">
               <a:rPr lang="en-US" smtClean="0"/>
-              <a:t>8/25/2018</a:t>
+              <a:t>8/30/2018</a:t>
             </a:fld>
             <a:endParaRPr lang="en-US"/>
           </a:p>
@@ -458,7 +458,7 @@
           <a:p>
             <a:fld id="{E992569B-202C-4FD8-B783-901FE4087DE5}" type="datetimeFigureOut">
               <a:rPr lang="en-US" smtClean="0"/>
-              <a:t>8/25/2018</a:t>
+              <a:t>8/30/2018</a:t>
             </a:fld>
             <a:endParaRPr lang="en-US"/>
           </a:p>
@@ -666,7 +666,7 @@
           <a:p>
             <a:fld id="{E992569B-202C-4FD8-B783-901FE4087DE5}" type="datetimeFigureOut">
               <a:rPr lang="en-US" smtClean="0"/>
-              <a:t>8/25/2018</a:t>
+              <a:t>8/30/2018</a:t>
             </a:fld>
             <a:endParaRPr lang="en-US"/>
           </a:p>
@@ -864,7 +864,7 @@
           <a:p>
             <a:fld id="{E992569B-202C-4FD8-B783-901FE4087DE5}" type="datetimeFigureOut">
               <a:rPr lang="en-US" smtClean="0"/>
-              <a:t>8/25/2018</a:t>
+              <a:t>8/30/2018</a:t>
             </a:fld>
             <a:endParaRPr lang="en-US"/>
           </a:p>
@@ -1139,7 +1139,7 @@
           <a:p>
             <a:fld id="{E992569B-202C-4FD8-B783-901FE4087DE5}" type="datetimeFigureOut">
               <a:rPr lang="en-US" smtClean="0"/>
-              <a:t>8/25/2018</a:t>
+              <a:t>8/30/2018</a:t>
             </a:fld>
             <a:endParaRPr lang="en-US"/>
           </a:p>
@@ -1404,7 +1404,7 @@
           <a:p>
             <a:fld id="{E992569B-202C-4FD8-B783-901FE4087DE5}" type="datetimeFigureOut">
               <a:rPr lang="en-US" smtClean="0"/>
-              <a:t>8/25/2018</a:t>
+              <a:t>8/30/2018</a:t>
             </a:fld>
             <a:endParaRPr lang="en-US"/>
           </a:p>
@@ -1816,7 +1816,7 @@
           <a:p>
             <a:fld id="{E992569B-202C-4FD8-B783-901FE4087DE5}" type="datetimeFigureOut">
               <a:rPr lang="en-US" smtClean="0"/>
-              <a:t>8/25/2018</a:t>
+              <a:t>8/30/2018</a:t>
             </a:fld>
             <a:endParaRPr lang="en-US"/>
           </a:p>
@@ -1957,7 +1957,7 @@
           <a:p>
             <a:fld id="{E992569B-202C-4FD8-B783-901FE4087DE5}" type="datetimeFigureOut">
               <a:rPr lang="en-US" smtClean="0"/>
-              <a:t>8/25/2018</a:t>
+              <a:t>8/30/2018</a:t>
             </a:fld>
             <a:endParaRPr lang="en-US"/>
           </a:p>
@@ -2070,7 +2070,7 @@
           <a:p>
             <a:fld id="{E992569B-202C-4FD8-B783-901FE4087DE5}" type="datetimeFigureOut">
               <a:rPr lang="en-US" smtClean="0"/>
-              <a:t>8/25/2018</a:t>
+              <a:t>8/30/2018</a:t>
             </a:fld>
             <a:endParaRPr lang="en-US"/>
           </a:p>
@@ -2381,7 +2381,7 @@
           <a:p>
             <a:fld id="{E992569B-202C-4FD8-B783-901FE4087DE5}" type="datetimeFigureOut">
               <a:rPr lang="en-US" smtClean="0"/>
-              <a:t>8/25/2018</a:t>
+              <a:t>8/30/2018</a:t>
             </a:fld>
             <a:endParaRPr lang="en-US"/>
           </a:p>
@@ -2669,7 +2669,7 @@
           <a:p>
             <a:fld id="{E992569B-202C-4FD8-B783-901FE4087DE5}" type="datetimeFigureOut">
               <a:rPr lang="en-US" smtClean="0"/>
-              <a:t>8/25/2018</a:t>
+              <a:t>8/30/2018</a:t>
             </a:fld>
             <a:endParaRPr lang="en-US"/>
           </a:p>
@@ -2910,7 +2910,7 @@
           <a:p>
             <a:fld id="{E992569B-202C-4FD8-B783-901FE4087DE5}" type="datetimeFigureOut">
               <a:rPr lang="en-US" smtClean="0"/>
-              <a:t>8/25/2018</a:t>
+              <a:t>8/30/2018</a:t>
             </a:fld>
             <a:endParaRPr lang="en-US"/>
           </a:p>
@@ -15579,8 +15579,10 @@
               <a:alpha val="25098"/>
             </a:srgbClr>
           </a:solidFill>
-          <a:ln>
-            <a:noFill/>
+          <a:ln w="12700">
+            <a:solidFill>
+              <a:schemeClr val="tx1"/>
+            </a:solidFill>
           </a:ln>
         </p:spPr>
         <p:style>
@@ -15737,8 +15739,10 @@
               <a:alpha val="25098"/>
             </a:srgbClr>
           </a:solidFill>
-          <a:ln>
-            <a:noFill/>
+          <a:ln w="12700">
+            <a:solidFill>
+              <a:schemeClr val="tx1"/>
+            </a:solidFill>
           </a:ln>
         </p:spPr>
         <p:style>

</xml_diff>

<commit_message>
Last A presolve on CPU
</commit_message>
<xml_diff>
--- a/data/process.pptx
+++ b/data/process.pptx
@@ -260,7 +260,7 @@
           <a:p>
             <a:fld id="{E992569B-202C-4FD8-B783-901FE4087DE5}" type="datetimeFigureOut">
               <a:rPr lang="en-US" smtClean="0"/>
-              <a:t>8/31/2018</a:t>
+              <a:t>9/6/2018</a:t>
             </a:fld>
             <a:endParaRPr lang="en-US"/>
           </a:p>
@@ -458,7 +458,7 @@
           <a:p>
             <a:fld id="{E992569B-202C-4FD8-B783-901FE4087DE5}" type="datetimeFigureOut">
               <a:rPr lang="en-US" smtClean="0"/>
-              <a:t>8/31/2018</a:t>
+              <a:t>9/6/2018</a:t>
             </a:fld>
             <a:endParaRPr lang="en-US"/>
           </a:p>
@@ -666,7 +666,7 @@
           <a:p>
             <a:fld id="{E992569B-202C-4FD8-B783-901FE4087DE5}" type="datetimeFigureOut">
               <a:rPr lang="en-US" smtClean="0"/>
-              <a:t>8/31/2018</a:t>
+              <a:t>9/6/2018</a:t>
             </a:fld>
             <a:endParaRPr lang="en-US"/>
           </a:p>
@@ -864,7 +864,7 @@
           <a:p>
             <a:fld id="{E992569B-202C-4FD8-B783-901FE4087DE5}" type="datetimeFigureOut">
               <a:rPr lang="en-US" smtClean="0"/>
-              <a:t>8/31/2018</a:t>
+              <a:t>9/6/2018</a:t>
             </a:fld>
             <a:endParaRPr lang="en-US"/>
           </a:p>
@@ -1139,7 +1139,7 @@
           <a:p>
             <a:fld id="{E992569B-202C-4FD8-B783-901FE4087DE5}" type="datetimeFigureOut">
               <a:rPr lang="en-US" smtClean="0"/>
-              <a:t>8/31/2018</a:t>
+              <a:t>9/6/2018</a:t>
             </a:fld>
             <a:endParaRPr lang="en-US"/>
           </a:p>
@@ -1404,7 +1404,7 @@
           <a:p>
             <a:fld id="{E992569B-202C-4FD8-B783-901FE4087DE5}" type="datetimeFigureOut">
               <a:rPr lang="en-US" smtClean="0"/>
-              <a:t>8/31/2018</a:t>
+              <a:t>9/6/2018</a:t>
             </a:fld>
             <a:endParaRPr lang="en-US"/>
           </a:p>
@@ -1816,7 +1816,7 @@
           <a:p>
             <a:fld id="{E992569B-202C-4FD8-B783-901FE4087DE5}" type="datetimeFigureOut">
               <a:rPr lang="en-US" smtClean="0"/>
-              <a:t>8/31/2018</a:t>
+              <a:t>9/6/2018</a:t>
             </a:fld>
             <a:endParaRPr lang="en-US"/>
           </a:p>
@@ -1957,7 +1957,7 @@
           <a:p>
             <a:fld id="{E992569B-202C-4FD8-B783-901FE4087DE5}" type="datetimeFigureOut">
               <a:rPr lang="en-US" smtClean="0"/>
-              <a:t>8/31/2018</a:t>
+              <a:t>9/6/2018</a:t>
             </a:fld>
             <a:endParaRPr lang="en-US"/>
           </a:p>
@@ -2070,7 +2070,7 @@
           <a:p>
             <a:fld id="{E992569B-202C-4FD8-B783-901FE4087DE5}" type="datetimeFigureOut">
               <a:rPr lang="en-US" smtClean="0"/>
-              <a:t>8/31/2018</a:t>
+              <a:t>9/6/2018</a:t>
             </a:fld>
             <a:endParaRPr lang="en-US"/>
           </a:p>
@@ -2381,7 +2381,7 @@
           <a:p>
             <a:fld id="{E992569B-202C-4FD8-B783-901FE4087DE5}" type="datetimeFigureOut">
               <a:rPr lang="en-US" smtClean="0"/>
-              <a:t>8/31/2018</a:t>
+              <a:t>9/6/2018</a:t>
             </a:fld>
             <a:endParaRPr lang="en-US"/>
           </a:p>
@@ -2669,7 +2669,7 @@
           <a:p>
             <a:fld id="{E992569B-202C-4FD8-B783-901FE4087DE5}" type="datetimeFigureOut">
               <a:rPr lang="en-US" smtClean="0"/>
-              <a:t>8/31/2018</a:t>
+              <a:t>9/6/2018</a:t>
             </a:fld>
             <a:endParaRPr lang="en-US"/>
           </a:p>
@@ -2910,7 +2910,7 @@
           <a:p>
             <a:fld id="{E992569B-202C-4FD8-B783-901FE4087DE5}" type="datetimeFigureOut">
               <a:rPr lang="en-US" smtClean="0"/>
-              <a:t>8/31/2018</a:t>
+              <a:t>9/6/2018</a:t>
             </a:fld>
             <a:endParaRPr lang="en-US"/>
           </a:p>
@@ -14335,58 +14335,6 @@
       </p:sp>
       <p:sp>
         <p:nvSpPr>
-          <p:cNvPr id="311" name="Rectangle 310">
-            <a:extLst>
-              <a:ext uri="{FF2B5EF4-FFF2-40B4-BE49-F238E27FC236}">
-                <a16:creationId xmlns:a16="http://schemas.microsoft.com/office/drawing/2014/main" id="{8B0D5090-D2C4-4B4F-B16B-7D4292942EF3}"/>
-              </a:ext>
-            </a:extLst>
-          </p:cNvPr>
-          <p:cNvSpPr/>
-          <p:nvPr/>
-        </p:nvSpPr>
-        <p:spPr>
-          <a:xfrm>
-            <a:off x="3988990" y="2287613"/>
-            <a:ext cx="770938" cy="250754"/>
-          </a:xfrm>
-          <a:prstGeom prst="rect">
-            <a:avLst/>
-          </a:prstGeom>
-          <a:solidFill>
-            <a:srgbClr val="FF0000"/>
-          </a:solidFill>
-        </p:spPr>
-        <p:style>
-          <a:lnRef idx="2">
-            <a:schemeClr val="accent3">
-              <a:shade val="50000"/>
-            </a:schemeClr>
-          </a:lnRef>
-          <a:fillRef idx="1">
-            <a:schemeClr val="accent3"/>
-          </a:fillRef>
-          <a:effectRef idx="0">
-            <a:schemeClr val="accent3"/>
-          </a:effectRef>
-          <a:fontRef idx="minor">
-            <a:schemeClr val="lt1"/>
-          </a:fontRef>
-        </p:style>
-        <p:txBody>
-          <a:bodyPr rtlCol="0" anchor="ctr"/>
-          <a:lstStyle/>
-          <a:p>
-            <a:pPr algn="ctr"/>
-            <a:r>
-              <a:rPr lang="en-US" sz="1000" dirty="0"/>
-              <a:t>I(R(A))</a:t>
-            </a:r>
-          </a:p>
-        </p:txBody>
-      </p:sp>
-      <p:sp>
-        <p:nvSpPr>
           <p:cNvPr id="157" name="Oval 156">
             <a:extLst>
               <a:ext uri="{FF2B5EF4-FFF2-40B4-BE49-F238E27FC236}">
@@ -14616,7 +14564,7 @@
         </p:nvSpPr>
         <p:spPr>
           <a:xfrm>
-            <a:off x="2133390" y="5513561"/>
+            <a:off x="3145627" y="5470775"/>
             <a:ext cx="393379" cy="184810"/>
           </a:xfrm>
           <a:prstGeom prst="bevel">
@@ -14889,67 +14837,6 @@
       </p:sp>
       <p:sp>
         <p:nvSpPr>
-          <p:cNvPr id="119" name="Rectangle: Beveled 118">
-            <a:extLst>
-              <a:ext uri="{FF2B5EF4-FFF2-40B4-BE49-F238E27FC236}">
-                <a16:creationId xmlns:a16="http://schemas.microsoft.com/office/drawing/2014/main" id="{6800B082-4ACC-45BD-95A7-B5A3B90E5211}"/>
-              </a:ext>
-            </a:extLst>
-          </p:cNvPr>
-          <p:cNvSpPr/>
-          <p:nvPr/>
-        </p:nvSpPr>
-        <p:spPr>
-          <a:xfrm>
-            <a:off x="4987882" y="2176802"/>
-            <a:ext cx="393379" cy="184810"/>
-          </a:xfrm>
-          <a:prstGeom prst="bevel">
-            <a:avLst/>
-          </a:prstGeom>
-          <a:noFill/>
-          <a:ln w="9525" cap="flat" cmpd="sng" algn="ctr">
-            <a:solidFill>
-              <a:srgbClr val="FF0000"/>
-            </a:solidFill>
-            <a:prstDash val="solid"/>
-            <a:round/>
-            <a:headEnd type="none" w="med" len="med"/>
-            <a:tailEnd type="none" w="med" len="med"/>
-          </a:ln>
-        </p:spPr>
-        <p:style>
-          <a:lnRef idx="0">
-            <a:scrgbClr r="0" g="0" b="0"/>
-          </a:lnRef>
-          <a:fillRef idx="0">
-            <a:scrgbClr r="0" g="0" b="0"/>
-          </a:fillRef>
-          <a:effectRef idx="0">
-            <a:scrgbClr r="0" g="0" b="0"/>
-          </a:effectRef>
-          <a:fontRef idx="minor">
-            <a:schemeClr val="accent6"/>
-          </a:fontRef>
-        </p:style>
-        <p:txBody>
-          <a:bodyPr rtlCol="0" anchor="ctr"/>
-          <a:lstStyle/>
-          <a:p>
-            <a:pPr algn="ctr"/>
-            <a:r>
-              <a:rPr lang="en-US" sz="700" dirty="0">
-                <a:solidFill>
-                  <a:srgbClr val="FF0000"/>
-                </a:solidFill>
-              </a:rPr>
-              <a:t>?</a:t>
-            </a:r>
-          </a:p>
-        </p:txBody>
-      </p:sp>
-      <p:sp>
-        <p:nvSpPr>
           <p:cNvPr id="120" name="Rectangle: Beveled 119">
             <a:extLst>
               <a:ext uri="{FF2B5EF4-FFF2-40B4-BE49-F238E27FC236}">
@@ -15121,67 +15008,6 @@
       </p:sp>
       <p:sp>
         <p:nvSpPr>
-          <p:cNvPr id="127" name="Rectangle: Beveled 126">
-            <a:extLst>
-              <a:ext uri="{FF2B5EF4-FFF2-40B4-BE49-F238E27FC236}">
-                <a16:creationId xmlns:a16="http://schemas.microsoft.com/office/drawing/2014/main" id="{BAF76FE2-77D7-41BA-9E17-EB184C770B26}"/>
-              </a:ext>
-            </a:extLst>
-          </p:cNvPr>
-          <p:cNvSpPr/>
-          <p:nvPr/>
-        </p:nvSpPr>
-        <p:spPr>
-          <a:xfrm>
-            <a:off x="8905111" y="5187520"/>
-            <a:ext cx="393379" cy="184810"/>
-          </a:xfrm>
-          <a:prstGeom prst="bevel">
-            <a:avLst/>
-          </a:prstGeom>
-          <a:noFill/>
-          <a:ln w="9525" cap="flat" cmpd="sng" algn="ctr">
-            <a:solidFill>
-              <a:srgbClr val="FF0000"/>
-            </a:solidFill>
-            <a:prstDash val="solid"/>
-            <a:round/>
-            <a:headEnd type="none" w="med" len="med"/>
-            <a:tailEnd type="none" w="med" len="med"/>
-          </a:ln>
-        </p:spPr>
-        <p:style>
-          <a:lnRef idx="0">
-            <a:scrgbClr r="0" g="0" b="0"/>
-          </a:lnRef>
-          <a:fillRef idx="0">
-            <a:scrgbClr r="0" g="0" b="0"/>
-          </a:fillRef>
-          <a:effectRef idx="0">
-            <a:scrgbClr r="0" g="0" b="0"/>
-          </a:effectRef>
-          <a:fontRef idx="minor">
-            <a:schemeClr val="accent6"/>
-          </a:fontRef>
-        </p:style>
-        <p:txBody>
-          <a:bodyPr rtlCol="0" anchor="ctr"/>
-          <a:lstStyle/>
-          <a:p>
-            <a:pPr algn="ctr"/>
-            <a:r>
-              <a:rPr lang="en-US" sz="700" dirty="0">
-                <a:solidFill>
-                  <a:srgbClr val="FF0000"/>
-                </a:solidFill>
-              </a:rPr>
-              <a:t>?</a:t>
-            </a:r>
-          </a:p>
-        </p:txBody>
-      </p:sp>
-      <p:sp>
-        <p:nvSpPr>
           <p:cNvPr id="14" name="Double Bracket 13">
             <a:extLst>
               <a:ext uri="{FF2B5EF4-FFF2-40B4-BE49-F238E27FC236}">
@@ -15892,8 +15718,8 @@
         </p:nvSpPr>
         <p:spPr>
           <a:xfrm>
-            <a:off x="3851003" y="2160906"/>
-            <a:ext cx="2434126" cy="2955391"/>
+            <a:off x="4569475" y="2375965"/>
+            <a:ext cx="1715653" cy="2740332"/>
           </a:xfrm>
           <a:prstGeom prst="roundRect">
             <a:avLst/>
@@ -15929,6 +15755,288 @@
           <a:p>
             <a:pPr algn="ctr"/>
             <a:endParaRPr lang="en-US"/>
+          </a:p>
+        </p:txBody>
+      </p:sp>
+      <p:sp>
+        <p:nvSpPr>
+          <p:cNvPr id="145" name="Rectangle: Rounded Corners 144">
+            <a:extLst>
+              <a:ext uri="{FF2B5EF4-FFF2-40B4-BE49-F238E27FC236}">
+                <a16:creationId xmlns:a16="http://schemas.microsoft.com/office/drawing/2014/main" id="{E016A7A6-CBD7-471E-98EC-3650F1F179B5}"/>
+              </a:ext>
+            </a:extLst>
+          </p:cNvPr>
+          <p:cNvSpPr/>
+          <p:nvPr/>
+        </p:nvSpPr>
+        <p:spPr>
+          <a:xfrm>
+            <a:off x="4733238" y="5176224"/>
+            <a:ext cx="1827030" cy="1487944"/>
+          </a:xfrm>
+          <a:prstGeom prst="roundRect">
+            <a:avLst/>
+          </a:prstGeom>
+          <a:solidFill>
+            <a:srgbClr val="70AD47">
+              <a:alpha val="25098"/>
+            </a:srgbClr>
+          </a:solidFill>
+          <a:ln w="12700">
+            <a:solidFill>
+              <a:schemeClr val="tx1"/>
+            </a:solidFill>
+          </a:ln>
+        </p:spPr>
+        <p:style>
+          <a:lnRef idx="0">
+            <a:scrgbClr r="0" g="0" b="0"/>
+          </a:lnRef>
+          <a:fillRef idx="0">
+            <a:scrgbClr r="0" g="0" b="0"/>
+          </a:fillRef>
+          <a:effectRef idx="0">
+            <a:scrgbClr r="0" g="0" b="0"/>
+          </a:effectRef>
+          <a:fontRef idx="minor">
+            <a:schemeClr val="lt1"/>
+          </a:fontRef>
+        </p:style>
+        <p:txBody>
+          <a:bodyPr rtlCol="0" anchor="ctr"/>
+          <a:lstStyle/>
+          <a:p>
+            <a:pPr algn="ctr"/>
+            <a:endParaRPr lang="en-US"/>
+          </a:p>
+        </p:txBody>
+      </p:sp>
+      <p:sp>
+        <p:nvSpPr>
+          <p:cNvPr id="148" name="Rectangle: Beveled 147">
+            <a:extLst>
+              <a:ext uri="{FF2B5EF4-FFF2-40B4-BE49-F238E27FC236}">
+                <a16:creationId xmlns:a16="http://schemas.microsoft.com/office/drawing/2014/main" id="{07A886C6-47F6-4544-9A4E-E844F2841569}"/>
+              </a:ext>
+            </a:extLst>
+          </p:cNvPr>
+          <p:cNvSpPr/>
+          <p:nvPr/>
+        </p:nvSpPr>
+        <p:spPr>
+          <a:xfrm>
+            <a:off x="8884978" y="5195922"/>
+            <a:ext cx="393379" cy="184810"/>
+          </a:xfrm>
+          <a:prstGeom prst="bevel">
+            <a:avLst/>
+          </a:prstGeom>
+          <a:noFill/>
+          <a:ln w="9525" cap="flat" cmpd="sng" algn="ctr">
+            <a:solidFill>
+              <a:schemeClr val="accent6"/>
+            </a:solidFill>
+            <a:prstDash val="solid"/>
+            <a:round/>
+            <a:headEnd type="none" w="med" len="med"/>
+            <a:tailEnd type="none" w="med" len="med"/>
+          </a:ln>
+        </p:spPr>
+        <p:style>
+          <a:lnRef idx="0">
+            <a:scrgbClr r="0" g="0" b="0"/>
+          </a:lnRef>
+          <a:fillRef idx="0">
+            <a:scrgbClr r="0" g="0" b="0"/>
+          </a:fillRef>
+          <a:effectRef idx="0">
+            <a:scrgbClr r="0" g="0" b="0"/>
+          </a:effectRef>
+          <a:fontRef idx="minor">
+            <a:schemeClr val="accent6"/>
+          </a:fontRef>
+        </p:style>
+        <p:txBody>
+          <a:bodyPr rtlCol="0" anchor="ctr"/>
+          <a:lstStyle/>
+          <a:p>
+            <a:pPr algn="ctr"/>
+            <a:r>
+              <a:rPr lang="en-US" sz="700" dirty="0"/>
+              <a:t>CPU</a:t>
+            </a:r>
+          </a:p>
+        </p:txBody>
+      </p:sp>
+      <p:sp>
+        <p:nvSpPr>
+          <p:cNvPr id="149" name="Rectangle: Beveled 148">
+            <a:extLst>
+              <a:ext uri="{FF2B5EF4-FFF2-40B4-BE49-F238E27FC236}">
+                <a16:creationId xmlns:a16="http://schemas.microsoft.com/office/drawing/2014/main" id="{E404FDA9-C3CB-4513-9E7B-D73B607ED0C4}"/>
+              </a:ext>
+            </a:extLst>
+          </p:cNvPr>
+          <p:cNvSpPr/>
+          <p:nvPr/>
+        </p:nvSpPr>
+        <p:spPr>
+          <a:xfrm>
+            <a:off x="8582625" y="4846129"/>
+            <a:ext cx="925568" cy="160586"/>
+          </a:xfrm>
+          <a:prstGeom prst="bevel">
+            <a:avLst/>
+          </a:prstGeom>
+          <a:noFill/>
+          <a:ln w="9525" cap="flat" cmpd="sng" algn="ctr">
+            <a:solidFill>
+              <a:schemeClr val="accent3"/>
+            </a:solidFill>
+            <a:prstDash val="solid"/>
+            <a:round/>
+            <a:headEnd type="none" w="med" len="med"/>
+            <a:tailEnd type="none" w="med" len="med"/>
+          </a:ln>
+        </p:spPr>
+        <p:style>
+          <a:lnRef idx="0">
+            <a:scrgbClr r="0" g="0" b="0"/>
+          </a:lnRef>
+          <a:fillRef idx="0">
+            <a:scrgbClr r="0" g="0" b="0"/>
+          </a:fillRef>
+          <a:effectRef idx="0">
+            <a:scrgbClr r="0" g="0" b="0"/>
+          </a:effectRef>
+          <a:fontRef idx="minor">
+            <a:schemeClr val="accent3"/>
+          </a:fontRef>
+        </p:style>
+        <p:txBody>
+          <a:bodyPr rtlCol="0" anchor="ctr"/>
+          <a:lstStyle/>
+          <a:p>
+            <a:pPr algn="ctr"/>
+            <a:r>
+              <a:rPr lang="en-US" sz="700" dirty="0"/>
+              <a:t>Transfer &gt; CPU</a:t>
+            </a:r>
+          </a:p>
+        </p:txBody>
+      </p:sp>
+      <p:sp>
+        <p:nvSpPr>
+          <p:cNvPr id="152" name="Rectangle: Beveled 151">
+            <a:extLst>
+              <a:ext uri="{FF2B5EF4-FFF2-40B4-BE49-F238E27FC236}">
+                <a16:creationId xmlns:a16="http://schemas.microsoft.com/office/drawing/2014/main" id="{44CE5164-70D9-4F65-AC6B-BAFE8E464C36}"/>
+              </a:ext>
+            </a:extLst>
+          </p:cNvPr>
+          <p:cNvSpPr/>
+          <p:nvPr/>
+        </p:nvSpPr>
+        <p:spPr>
+          <a:xfrm>
+            <a:off x="8370485" y="5947727"/>
+            <a:ext cx="1028986" cy="160586"/>
+          </a:xfrm>
+          <a:prstGeom prst="bevel">
+            <a:avLst/>
+          </a:prstGeom>
+          <a:noFill/>
+          <a:ln w="9525" cap="flat" cmpd="sng" algn="ctr">
+            <a:solidFill>
+              <a:schemeClr val="accent3"/>
+            </a:solidFill>
+            <a:prstDash val="solid"/>
+            <a:round/>
+            <a:headEnd type="none" w="med" len="med"/>
+            <a:tailEnd type="none" w="med" len="med"/>
+          </a:ln>
+        </p:spPr>
+        <p:style>
+          <a:lnRef idx="0">
+            <a:scrgbClr r="0" g="0" b="0"/>
+          </a:lnRef>
+          <a:fillRef idx="0">
+            <a:scrgbClr r="0" g="0" b="0"/>
+          </a:fillRef>
+          <a:effectRef idx="0">
+            <a:scrgbClr r="0" g="0" b="0"/>
+          </a:effectRef>
+          <a:fontRef idx="minor">
+            <a:schemeClr val="accent3"/>
+          </a:fontRef>
+        </p:style>
+        <p:txBody>
+          <a:bodyPr rtlCol="0" anchor="ctr"/>
+          <a:lstStyle/>
+          <a:p>
+            <a:pPr algn="ctr"/>
+            <a:r>
+              <a:rPr lang="en-US" sz="700" dirty="0"/>
+              <a:t>Transfer &gt; GPU</a:t>
+            </a:r>
+          </a:p>
+        </p:txBody>
+      </p:sp>
+      <p:sp>
+        <p:nvSpPr>
+          <p:cNvPr id="153" name="Rectangle: Beveled 152">
+            <a:extLst>
+              <a:ext uri="{FF2B5EF4-FFF2-40B4-BE49-F238E27FC236}">
+                <a16:creationId xmlns:a16="http://schemas.microsoft.com/office/drawing/2014/main" id="{566F7014-FFD2-46FC-9999-9FE12A8D36CF}"/>
+              </a:ext>
+            </a:extLst>
+          </p:cNvPr>
+          <p:cNvSpPr/>
+          <p:nvPr/>
+        </p:nvSpPr>
+        <p:spPr>
+          <a:xfrm>
+            <a:off x="5755503" y="2210302"/>
+            <a:ext cx="393379" cy="184810"/>
+          </a:xfrm>
+          <a:prstGeom prst="bevel">
+            <a:avLst/>
+          </a:prstGeom>
+          <a:noFill/>
+          <a:ln w="9525" cap="flat" cmpd="sng" algn="ctr">
+            <a:solidFill>
+              <a:schemeClr val="accent2"/>
+            </a:solidFill>
+            <a:prstDash val="solid"/>
+            <a:round/>
+            <a:headEnd type="none" w="med" len="med"/>
+            <a:tailEnd type="none" w="med" len="med"/>
+          </a:ln>
+        </p:spPr>
+        <p:style>
+          <a:lnRef idx="0">
+            <a:scrgbClr r="0" g="0" b="0"/>
+          </a:lnRef>
+          <a:fillRef idx="0">
+            <a:scrgbClr r="0" g="0" b="0"/>
+          </a:fillRef>
+          <a:effectRef idx="0">
+            <a:scrgbClr r="0" g="0" b="0"/>
+          </a:effectRef>
+          <a:fontRef idx="minor">
+            <a:schemeClr val="accent2"/>
+          </a:fontRef>
+        </p:style>
+        <p:txBody>
+          <a:bodyPr rtlCol="0" anchor="ctr"/>
+          <a:lstStyle/>
+          <a:p>
+            <a:pPr algn="ctr"/>
+            <a:r>
+              <a:rPr lang="en-US" sz="700" dirty="0"/>
+              <a:t>GPU</a:t>
+            </a:r>
           </a:p>
         </p:txBody>
       </p:sp>

</xml_diff>

<commit_message>
updated process diagram with implementation progress
</commit_message>
<xml_diff>
--- a/data/process.pptx
+++ b/data/process.pptx
@@ -16040,6 +16040,222 @@
           </a:p>
         </p:txBody>
       </p:sp>
+      <p:sp>
+        <p:nvSpPr>
+          <p:cNvPr id="154" name="Rectangle: Rounded Corners 153">
+            <a:extLst>
+              <a:ext uri="{FF2B5EF4-FFF2-40B4-BE49-F238E27FC236}">
+                <a16:creationId xmlns:a16="http://schemas.microsoft.com/office/drawing/2014/main" id="{BF133AAA-7BAC-4CDF-880D-6CD444AA411A}"/>
+              </a:ext>
+            </a:extLst>
+          </p:cNvPr>
+          <p:cNvSpPr/>
+          <p:nvPr/>
+        </p:nvSpPr>
+        <p:spPr>
+          <a:xfrm>
+            <a:off x="6440811" y="999439"/>
+            <a:ext cx="2998308" cy="1171313"/>
+          </a:xfrm>
+          <a:prstGeom prst="roundRect">
+            <a:avLst/>
+          </a:prstGeom>
+          <a:solidFill>
+            <a:srgbClr val="70AD47">
+              <a:alpha val="25098"/>
+            </a:srgbClr>
+          </a:solidFill>
+          <a:ln w="12700">
+            <a:solidFill>
+              <a:schemeClr val="tx1"/>
+            </a:solidFill>
+          </a:ln>
+        </p:spPr>
+        <p:style>
+          <a:lnRef idx="0">
+            <a:scrgbClr r="0" g="0" b="0"/>
+          </a:lnRef>
+          <a:fillRef idx="0">
+            <a:scrgbClr r="0" g="0" b="0"/>
+          </a:fillRef>
+          <a:effectRef idx="0">
+            <a:scrgbClr r="0" g="0" b="0"/>
+          </a:effectRef>
+          <a:fontRef idx="minor">
+            <a:schemeClr val="lt1"/>
+          </a:fontRef>
+        </p:style>
+        <p:txBody>
+          <a:bodyPr rtlCol="0" anchor="ctr"/>
+          <a:lstStyle/>
+          <a:p>
+            <a:pPr algn="ctr"/>
+            <a:endParaRPr lang="en-US"/>
+          </a:p>
+        </p:txBody>
+      </p:sp>
+      <p:sp>
+        <p:nvSpPr>
+          <p:cNvPr id="155" name="Rectangle: Rounded Corners 154">
+            <a:extLst>
+              <a:ext uri="{FF2B5EF4-FFF2-40B4-BE49-F238E27FC236}">
+                <a16:creationId xmlns:a16="http://schemas.microsoft.com/office/drawing/2014/main" id="{01B3C918-F086-4053-99A9-BB9ECD1E9B97}"/>
+              </a:ext>
+            </a:extLst>
+          </p:cNvPr>
+          <p:cNvSpPr/>
+          <p:nvPr/>
+        </p:nvSpPr>
+        <p:spPr>
+          <a:xfrm>
+            <a:off x="6781727" y="1859008"/>
+            <a:ext cx="1208433" cy="1171313"/>
+          </a:xfrm>
+          <a:prstGeom prst="roundRect">
+            <a:avLst/>
+          </a:prstGeom>
+          <a:solidFill>
+            <a:srgbClr val="70AD47">
+              <a:alpha val="25098"/>
+            </a:srgbClr>
+          </a:solidFill>
+          <a:ln w="12700">
+            <a:solidFill>
+              <a:schemeClr val="tx1"/>
+            </a:solidFill>
+          </a:ln>
+        </p:spPr>
+        <p:style>
+          <a:lnRef idx="0">
+            <a:scrgbClr r="0" g="0" b="0"/>
+          </a:lnRef>
+          <a:fillRef idx="0">
+            <a:scrgbClr r="0" g="0" b="0"/>
+          </a:fillRef>
+          <a:effectRef idx="0">
+            <a:scrgbClr r="0" g="0" b="0"/>
+          </a:effectRef>
+          <a:fontRef idx="minor">
+            <a:schemeClr val="lt1"/>
+          </a:fontRef>
+        </p:style>
+        <p:txBody>
+          <a:bodyPr rtlCol="0" anchor="ctr"/>
+          <a:lstStyle/>
+          <a:p>
+            <a:pPr algn="ctr"/>
+            <a:endParaRPr lang="en-US"/>
+          </a:p>
+        </p:txBody>
+      </p:sp>
+      <p:sp>
+        <p:nvSpPr>
+          <p:cNvPr id="159" name="Rectangle: Rounded Corners 158">
+            <a:extLst>
+              <a:ext uri="{FF2B5EF4-FFF2-40B4-BE49-F238E27FC236}">
+                <a16:creationId xmlns:a16="http://schemas.microsoft.com/office/drawing/2014/main" id="{15FB1366-EB94-43EE-918D-B28778F6DA00}"/>
+              </a:ext>
+            </a:extLst>
+          </p:cNvPr>
+          <p:cNvSpPr/>
+          <p:nvPr/>
+        </p:nvSpPr>
+        <p:spPr>
+          <a:xfrm>
+            <a:off x="10793308" y="1838696"/>
+            <a:ext cx="1208433" cy="800126"/>
+          </a:xfrm>
+          <a:prstGeom prst="roundRect">
+            <a:avLst/>
+          </a:prstGeom>
+          <a:solidFill>
+            <a:srgbClr val="70AD47">
+              <a:alpha val="25098"/>
+            </a:srgbClr>
+          </a:solidFill>
+          <a:ln w="12700">
+            <a:solidFill>
+              <a:schemeClr val="tx1"/>
+            </a:solidFill>
+          </a:ln>
+        </p:spPr>
+        <p:style>
+          <a:lnRef idx="0">
+            <a:scrgbClr r="0" g="0" b="0"/>
+          </a:lnRef>
+          <a:fillRef idx="0">
+            <a:scrgbClr r="0" g="0" b="0"/>
+          </a:fillRef>
+          <a:effectRef idx="0">
+            <a:scrgbClr r="0" g="0" b="0"/>
+          </a:effectRef>
+          <a:fontRef idx="minor">
+            <a:schemeClr val="lt1"/>
+          </a:fontRef>
+        </p:style>
+        <p:txBody>
+          <a:bodyPr rtlCol="0" anchor="ctr"/>
+          <a:lstStyle/>
+          <a:p>
+            <a:pPr algn="ctr"/>
+            <a:endParaRPr lang="en-US"/>
+          </a:p>
+        </p:txBody>
+      </p:sp>
+      <p:sp>
+        <p:nvSpPr>
+          <p:cNvPr id="160" name="Rectangle: Rounded Corners 159">
+            <a:extLst>
+              <a:ext uri="{FF2B5EF4-FFF2-40B4-BE49-F238E27FC236}">
+                <a16:creationId xmlns:a16="http://schemas.microsoft.com/office/drawing/2014/main" id="{2B83BA0B-E595-44A0-825B-C2C5922E0F91}"/>
+              </a:ext>
+            </a:extLst>
+          </p:cNvPr>
+          <p:cNvSpPr/>
+          <p:nvPr/>
+        </p:nvSpPr>
+        <p:spPr>
+          <a:xfrm>
+            <a:off x="7419378" y="4504848"/>
+            <a:ext cx="2038074" cy="1804491"/>
+          </a:xfrm>
+          <a:prstGeom prst="roundRect">
+            <a:avLst/>
+          </a:prstGeom>
+          <a:solidFill>
+            <a:srgbClr val="70AD47">
+              <a:alpha val="25098"/>
+            </a:srgbClr>
+          </a:solidFill>
+          <a:ln w="12700">
+            <a:solidFill>
+              <a:schemeClr val="tx1"/>
+            </a:solidFill>
+          </a:ln>
+        </p:spPr>
+        <p:style>
+          <a:lnRef idx="0">
+            <a:scrgbClr r="0" g="0" b="0"/>
+          </a:lnRef>
+          <a:fillRef idx="0">
+            <a:scrgbClr r="0" g="0" b="0"/>
+          </a:fillRef>
+          <a:effectRef idx="0">
+            <a:scrgbClr r="0" g="0" b="0"/>
+          </a:effectRef>
+          <a:fontRef idx="minor">
+            <a:schemeClr val="lt1"/>
+          </a:fontRef>
+        </p:style>
+        <p:txBody>
+          <a:bodyPr rtlCol="0" anchor="ctr"/>
+          <a:lstStyle/>
+          <a:p>
+            <a:pPr algn="ctr"/>
+            <a:endParaRPr lang="en-US"/>
+          </a:p>
+        </p:txBody>
+      </p:sp>
     </p:spTree>
     <p:extLst>
       <p:ext uri="{BB962C8B-B14F-4D97-AF65-F5344CB8AC3E}">

</xml_diff>

<commit_message>
Working MGGPU with correct results. GS for i>0 is not deterministic
</commit_message>
<xml_diff>
--- a/data/process.pptx
+++ b/data/process.pptx
@@ -16066,9 +16066,7 @@
             </a:srgbClr>
           </a:solidFill>
           <a:ln w="12700">
-            <a:solidFill>
-              <a:schemeClr val="tx1"/>
-            </a:solidFill>
+            <a:noFill/>
           </a:ln>
         </p:spPr>
         <p:style>
@@ -16120,9 +16118,7 @@
             </a:srgbClr>
           </a:solidFill>
           <a:ln w="12700">
-            <a:solidFill>
-              <a:schemeClr val="tx1"/>
-            </a:solidFill>
+            <a:noFill/>
           </a:ln>
         </p:spPr>
         <p:style>
@@ -16162,7 +16158,7 @@
         </p:nvSpPr>
         <p:spPr>
           <a:xfrm>
-            <a:off x="10793308" y="1838696"/>
+            <a:off x="10813107" y="1862634"/>
             <a:ext cx="1208433" cy="800126"/>
           </a:xfrm>
           <a:prstGeom prst="roundRect">
@@ -16174,9 +16170,7 @@
             </a:srgbClr>
           </a:solidFill>
           <a:ln w="12700">
-            <a:solidFill>
-              <a:schemeClr val="tx1"/>
-            </a:solidFill>
+            <a:noFill/>
           </a:ln>
         </p:spPr>
         <p:style>
@@ -16228,9 +16222,111 @@
             </a:srgbClr>
           </a:solidFill>
           <a:ln w="12700">
-            <a:solidFill>
-              <a:schemeClr val="tx1"/>
-            </a:solidFill>
+            <a:noFill/>
+          </a:ln>
+        </p:spPr>
+        <p:style>
+          <a:lnRef idx="0">
+            <a:scrgbClr r="0" g="0" b="0"/>
+          </a:lnRef>
+          <a:fillRef idx="0">
+            <a:scrgbClr r="0" g="0" b="0"/>
+          </a:fillRef>
+          <a:effectRef idx="0">
+            <a:scrgbClr r="0" g="0" b="0"/>
+          </a:effectRef>
+          <a:fontRef idx="minor">
+            <a:schemeClr val="lt1"/>
+          </a:fontRef>
+        </p:style>
+        <p:txBody>
+          <a:bodyPr rtlCol="0" anchor="ctr"/>
+          <a:lstStyle/>
+          <a:p>
+            <a:pPr algn="ctr"/>
+            <a:endParaRPr lang="en-US"/>
+          </a:p>
+        </p:txBody>
+      </p:sp>
+      <p:sp>
+        <p:nvSpPr>
+          <p:cNvPr id="162" name="Rectangle: Rounded Corners 161">
+            <a:extLst>
+              <a:ext uri="{FF2B5EF4-FFF2-40B4-BE49-F238E27FC236}">
+                <a16:creationId xmlns:a16="http://schemas.microsoft.com/office/drawing/2014/main" id="{A1A71A1D-20C0-4A4A-A14C-305C71F3378B}"/>
+              </a:ext>
+            </a:extLst>
+          </p:cNvPr>
+          <p:cNvSpPr/>
+          <p:nvPr/>
+        </p:nvSpPr>
+        <p:spPr>
+          <a:xfrm>
+            <a:off x="9779334" y="2715305"/>
+            <a:ext cx="1854308" cy="1004123"/>
+          </a:xfrm>
+          <a:prstGeom prst="roundRect">
+            <a:avLst/>
+          </a:prstGeom>
+          <a:solidFill>
+            <a:srgbClr val="70AD47">
+              <a:alpha val="25098"/>
+            </a:srgbClr>
+          </a:solidFill>
+          <a:ln w="12700">
+            <a:noFill/>
+          </a:ln>
+        </p:spPr>
+        <p:style>
+          <a:lnRef idx="0">
+            <a:scrgbClr r="0" g="0" b="0"/>
+          </a:lnRef>
+          <a:fillRef idx="0">
+            <a:scrgbClr r="0" g="0" b="0"/>
+          </a:fillRef>
+          <a:effectRef idx="0">
+            <a:scrgbClr r="0" g="0" b="0"/>
+          </a:effectRef>
+          <a:fontRef idx="minor">
+            <a:schemeClr val="lt1"/>
+          </a:fontRef>
+        </p:style>
+        <p:txBody>
+          <a:bodyPr rtlCol="0" anchor="ctr"/>
+          <a:lstStyle/>
+          <a:p>
+            <a:pPr algn="ctr"/>
+            <a:endParaRPr lang="en-US"/>
+          </a:p>
+        </p:txBody>
+      </p:sp>
+      <p:sp>
+        <p:nvSpPr>
+          <p:cNvPr id="163" name="Rectangle: Rounded Corners 162">
+            <a:extLst>
+              <a:ext uri="{FF2B5EF4-FFF2-40B4-BE49-F238E27FC236}">
+                <a16:creationId xmlns:a16="http://schemas.microsoft.com/office/drawing/2014/main" id="{12A61E00-6FB8-4475-9B66-FDA163162CB6}"/>
+              </a:ext>
+            </a:extLst>
+          </p:cNvPr>
+          <p:cNvSpPr/>
+          <p:nvPr/>
+        </p:nvSpPr>
+        <p:spPr>
+          <a:xfrm>
+            <a:off x="7531768" y="2389343"/>
+            <a:ext cx="1208433" cy="1171313"/>
+          </a:xfrm>
+          <a:prstGeom prst="roundRect">
+            <a:avLst/>
+          </a:prstGeom>
+          <a:solidFill>
+            <a:srgbClr val="70AD47">
+              <a:alpha val="25098"/>
+            </a:srgbClr>
+          </a:solidFill>
+          <a:ln w="12700">
+            <a:noFill/>
           </a:ln>
         </p:spPr>
         <p:style>

</xml_diff>